<commit_message>
Neue Vorlagen für alle.
</commit_message>
<xml_diff>
--- a/Material für Abschlusspräsentation/Präsentationsvorlage für Edu.pptx
+++ b/Material für Abschlusspräsentation/Präsentationsvorlage für Edu.pptx
@@ -5,12 +5,17 @@
     <p:sldMasterId id="2147483648" r:id="rId1"/>
   </p:sldMasterIdLst>
   <p:notesMasterIdLst>
-    <p:notesMasterId r:id="rId5"/>
+    <p:notesMasterId r:id="rId10"/>
   </p:notesMasterIdLst>
   <p:sldIdLst>
     <p:sldId id="257" r:id="rId2"/>
-    <p:sldId id="259" r:id="rId3"/>
-    <p:sldId id="260" r:id="rId4"/>
+    <p:sldId id="266" r:id="rId3"/>
+    <p:sldId id="261" r:id="rId4"/>
+    <p:sldId id="262" r:id="rId5"/>
+    <p:sldId id="263" r:id="rId6"/>
+    <p:sldId id="264" r:id="rId7"/>
+    <p:sldId id="265" r:id="rId8"/>
+    <p:sldId id="260" r:id="rId9"/>
   </p:sldIdLst>
   <p:sldSz cx="12192000" cy="6858000"/>
   <p:notesSz cx="6858000" cy="9144000"/>
@@ -199,7 +204,7 @@
           <a:p>
             <a:fld id="{398C6B7F-DE70-4723-AEA0-F3505BEE67B9}" type="datetimeFigureOut">
               <a:rPr lang="de-DE" smtClean="0"/>
-              <a:t>16.07.2020</a:t>
+              <a:t>20.07.2020</a:t>
             </a:fld>
             <a:endParaRPr lang="de-DE"/>
           </a:p>
@@ -2957,7 +2962,7 @@
         <p:spPr>
           <a:xfrm>
             <a:off x="4994031" y="2523392"/>
-            <a:ext cx="2171700" cy="1529861"/>
+            <a:ext cx="2646484" cy="1529861"/>
           </a:xfrm>
           <a:prstGeom prst="rect">
             <a:avLst/>
@@ -3116,159 +3121,10 @@
           <a:chExt cx="0" cy="0"/>
         </a:xfrm>
       </p:grpSpPr>
-      <p:sp>
-        <p:nvSpPr>
-          <p:cNvPr id="2" name="Titel 1">
-            <a:extLst>
-              <a:ext uri="{FF2B5EF4-FFF2-40B4-BE49-F238E27FC236}">
-                <a16:creationId xmlns:a16="http://schemas.microsoft.com/office/drawing/2014/main" id="{8863E4F2-E5EC-43C5-B897-8C27EEEE8811}"/>
-              </a:ext>
-            </a:extLst>
-          </p:cNvPr>
-          <p:cNvSpPr>
-            <a:spLocks noGrp="1"/>
-          </p:cNvSpPr>
-          <p:nvPr>
-            <p:ph type="title"/>
-          </p:nvPr>
-        </p:nvSpPr>
-        <p:spPr>
-          <a:xfrm>
-            <a:off x="2151992" y="204952"/>
-            <a:ext cx="10040008" cy="362606"/>
-          </a:xfrm>
-        </p:spPr>
-        <p:txBody>
-          <a:bodyPr>
-            <a:noAutofit/>
-          </a:bodyPr>
-          <a:lstStyle/>
-          <a:p>
-            <a:pPr algn="ctr"/>
-            <a:r>
-              <a:rPr lang="de-DE" sz="2400" dirty="0" err="1">
-                <a:solidFill>
-                  <a:schemeClr val="bg1">
-                    <a:lumMod val="85000"/>
-                    <a:lumOff val="15000"/>
-                  </a:schemeClr>
-                </a:solidFill>
-                <a:effectLst>
-                  <a:reflection blurRad="6350" stA="60000" endA="900" endPos="60000" dist="29997" dir="5400000" sy="-100000" algn="bl" rotWithShape="0"/>
-                </a:effectLst>
-                <a:latin typeface="Corbel Light" panose="020B0303020204020204" pitchFamily="34" charset="0"/>
-              </a:rPr>
-              <a:t>Arduino&amp;</a:t>
-            </a:r>
-            <a:r>
-              <a:rPr lang="de-DE" sz="2400" spc="250" dirty="0" err="1">
-                <a:solidFill>
-                  <a:schemeClr val="bg1">
-                    <a:lumMod val="85000"/>
-                    <a:lumOff val="15000"/>
-                  </a:schemeClr>
-                </a:solidFill>
-                <a:effectLst>
-                  <a:reflection blurRad="6350" stA="60000" endA="900" endPos="60000" dist="29997" dir="5400000" sy="-100000" algn="bl" rotWithShape="0"/>
-                </a:effectLst>
-                <a:latin typeface="Corbel Light" panose="020B0303020204020204" pitchFamily="34" charset="0"/>
-              </a:rPr>
-              <a:t>SensorikKommunikation</a:t>
-            </a:r>
-            <a:r>
-              <a:rPr lang="de-DE" sz="2400" spc="250" dirty="0" err="1">
-                <a:effectLst>
-                  <a:reflection blurRad="6350" stA="60000" endA="900" endPos="60000" dist="29997" dir="5400000" sy="-100000" algn="bl" rotWithShape="0"/>
-                </a:effectLst>
-                <a:latin typeface="Corbel Light" panose="020B0303020204020204" pitchFamily="34" charset="0"/>
-              </a:rPr>
-              <a:t>Backend</a:t>
-            </a:r>
-            <a:r>
-              <a:rPr lang="de-DE" sz="2400" spc="250" dirty="0" err="1">
-                <a:solidFill>
-                  <a:schemeClr val="bg1">
-                    <a:lumMod val="85000"/>
-                    <a:lumOff val="15000"/>
-                  </a:schemeClr>
-                </a:solidFill>
-                <a:effectLst>
-                  <a:reflection blurRad="6350" stA="60000" endA="900" endPos="60000" dist="29997" dir="5400000" sy="-100000" algn="bl" rotWithShape="0"/>
-                </a:effectLst>
-                <a:latin typeface="Corbel Light" panose="020B0303020204020204" pitchFamily="34" charset="0"/>
-              </a:rPr>
-              <a:t>VisualisierungRoboNova</a:t>
-            </a:r>
-            <a:endParaRPr lang="de-DE" sz="2400" spc="250" dirty="0">
-              <a:solidFill>
-                <a:schemeClr val="bg1">
-                  <a:lumMod val="85000"/>
-                  <a:lumOff val="15000"/>
-                </a:schemeClr>
-              </a:solidFill>
-              <a:effectLst>
-                <a:reflection blurRad="6350" stA="60000" endA="900" endPos="60000" dist="29997" dir="5400000" sy="-100000" algn="bl" rotWithShape="0"/>
-              </a:effectLst>
-              <a:latin typeface="Corbel Light" panose="020B0303020204020204" pitchFamily="34" charset="0"/>
-            </a:endParaRPr>
-          </a:p>
-        </p:txBody>
-      </p:sp>
-      <p:sp>
-        <p:nvSpPr>
-          <p:cNvPr id="8" name="Textfeld 7">
-            <a:extLst>
-              <a:ext uri="{FF2B5EF4-FFF2-40B4-BE49-F238E27FC236}">
-                <a16:creationId xmlns:a16="http://schemas.microsoft.com/office/drawing/2014/main" id="{53AE0C01-BA48-4AC0-9A6A-878E7B5942C9}"/>
-              </a:ext>
-            </a:extLst>
-          </p:cNvPr>
-          <p:cNvSpPr txBox="1"/>
-          <p:nvPr/>
-        </p:nvSpPr>
-        <p:spPr>
-          <a:xfrm>
-            <a:off x="140980" y="124645"/>
-            <a:ext cx="2011013" cy="523220"/>
-          </a:xfrm>
-          <a:prstGeom prst="rect">
-            <a:avLst/>
-          </a:prstGeom>
-          <a:noFill/>
-          <a:ln w="57150">
-            <a:solidFill>
-              <a:schemeClr val="tx1"/>
-            </a:solidFill>
-          </a:ln>
-        </p:spPr>
-        <p:txBody>
-          <a:bodyPr wrap="square" rtlCol="0">
-            <a:spAutoFit/>
-          </a:bodyPr>
-          <a:lstStyle>
-            <a:defPPr>
-              <a:defRPr lang="de-DE"/>
-            </a:defPPr>
-            <a:lvl1pPr>
-              <a:defRPr>
-                <a:latin typeface="Corbel Light" panose="020B0303020204020204" pitchFamily="34" charset="0"/>
-              </a:defRPr>
-            </a:lvl1pPr>
-          </a:lstStyle>
-          <a:p>
-            <a:pPr algn="ctr"/>
-            <a:r>
-              <a:rPr lang="de-DE" sz="2800" dirty="0" err="1"/>
-              <a:t>RoboMirror</a:t>
-            </a:r>
-            <a:endParaRPr lang="de-DE" sz="2800" dirty="0"/>
-          </a:p>
-        </p:txBody>
-      </p:sp>
     </p:spTree>
     <p:extLst>
       <p:ext uri="{BB962C8B-B14F-4D97-AF65-F5344CB8AC3E}">
-        <p14:creationId xmlns:p14="http://schemas.microsoft.com/office/powerpoint/2010/main" val="4133584170"/>
+        <p14:creationId xmlns:p14="http://schemas.microsoft.com/office/powerpoint/2010/main" val="592419933"/>
       </p:ext>
     </p:extLst>
   </p:cSld>
@@ -3278,95 +3134,6 @@
   <p:transition spd="slow">
     <p:push dir="u"/>
   </p:transition>
-  <p:timing>
-    <p:tnLst>
-      <p:par>
-        <p:cTn id="1" dur="indefinite" restart="never" nodeType="tmRoot">
-          <p:childTnLst>
-            <p:seq concurrent="1" nextAc="seek">
-              <p:cTn id="2" dur="indefinite" nodeType="mainSeq">
-                <p:childTnLst>
-                  <p:par>
-                    <p:cTn id="3" fill="hold">
-                      <p:stCondLst>
-                        <p:cond delay="indefinite"/>
-                        <p:cond evt="onBegin" delay="0">
-                          <p:tn val="2"/>
-                        </p:cond>
-                      </p:stCondLst>
-                      <p:childTnLst>
-                        <p:par>
-                          <p:cTn id="4" fill="hold">
-                            <p:stCondLst>
-                              <p:cond delay="0"/>
-                            </p:stCondLst>
-                            <p:childTnLst>
-                              <p:par>
-                                <p:cTn id="5" presetID="10" presetClass="entr" presetSubtype="0" fill="hold" grpId="0" nodeType="withEffect">
-                                  <p:stCondLst>
-                                    <p:cond delay="0"/>
-                                  </p:stCondLst>
-                                  <p:childTnLst>
-                                    <p:set>
-                                      <p:cBhvr>
-                                        <p:cTn id="6" dur="1" fill="hold">
-                                          <p:stCondLst>
-                                            <p:cond delay="0"/>
-                                          </p:stCondLst>
-                                        </p:cTn>
-                                        <p:tgtEl>
-                                          <p:spTgt spid="2"/>
-                                        </p:tgtEl>
-                                        <p:attrNameLst>
-                                          <p:attrName>style.visibility</p:attrName>
-                                        </p:attrNameLst>
-                                      </p:cBhvr>
-                                      <p:to>
-                                        <p:strVal val="visible"/>
-                                      </p:to>
-                                    </p:set>
-                                    <p:animEffect transition="in" filter="fade">
-                                      <p:cBhvr>
-                                        <p:cTn id="7" dur="500"/>
-                                        <p:tgtEl>
-                                          <p:spTgt spid="2"/>
-                                        </p:tgtEl>
-                                      </p:cBhvr>
-                                    </p:animEffect>
-                                  </p:childTnLst>
-                                </p:cTn>
-                              </p:par>
-                            </p:childTnLst>
-                          </p:cTn>
-                        </p:par>
-                      </p:childTnLst>
-                    </p:cTn>
-                  </p:par>
-                </p:childTnLst>
-              </p:cTn>
-              <p:prevCondLst>
-                <p:cond evt="onPrev" delay="0">
-                  <p:tgtEl>
-                    <p:sldTgt/>
-                  </p:tgtEl>
-                </p:cond>
-              </p:prevCondLst>
-              <p:nextCondLst>
-                <p:cond evt="onNext" delay="0">
-                  <p:tgtEl>
-                    <p:sldTgt/>
-                  </p:tgtEl>
-                </p:cond>
-              </p:nextCondLst>
-            </p:seq>
-          </p:childTnLst>
-        </p:cTn>
-      </p:par>
-    </p:tnLst>
-    <p:bldLst>
-      <p:bldP spid="2" grpId="0"/>
-    </p:bldLst>
-  </p:timing>
 </p:sld>
 </file>
 
@@ -3389,6 +3156,1028 @@
       </p:grpSpPr>
       <p:sp>
         <p:nvSpPr>
+          <p:cNvPr id="15" name="Textfeld 14">
+            <a:extLst>
+              <a:ext uri="{FF2B5EF4-FFF2-40B4-BE49-F238E27FC236}">
+                <a16:creationId xmlns:a16="http://schemas.microsoft.com/office/drawing/2014/main" id="{EDC0117D-58F4-467D-B022-5970DDCB4994}"/>
+              </a:ext>
+            </a:extLst>
+          </p:cNvPr>
+          <p:cNvSpPr txBox="1"/>
+          <p:nvPr/>
+        </p:nvSpPr>
+        <p:spPr>
+          <a:xfrm>
+            <a:off x="515891" y="362596"/>
+            <a:ext cx="5023184" cy="523220"/>
+          </a:xfrm>
+          <a:prstGeom prst="rect">
+            <a:avLst/>
+          </a:prstGeom>
+          <a:noFill/>
+          <a:ln>
+            <a:solidFill>
+              <a:schemeClr val="tx1"/>
+            </a:solidFill>
+          </a:ln>
+        </p:spPr>
+        <p:txBody>
+          <a:bodyPr wrap="square" rtlCol="0">
+            <a:spAutoFit/>
+          </a:bodyPr>
+          <a:lstStyle/>
+          <a:p>
+            <a:pPr algn="ctr"/>
+            <a:r>
+              <a:rPr lang="de-DE" sz="2800" spc="600" dirty="0">
+                <a:latin typeface="Corbel Light" panose="020B0303020204020204" pitchFamily="34" charset="0"/>
+              </a:rPr>
+              <a:t>Vorarbeit</a:t>
+            </a:r>
+          </a:p>
+        </p:txBody>
+      </p:sp>
+      <p:sp>
+        <p:nvSpPr>
+          <p:cNvPr id="11" name="Textfeld 10">
+            <a:extLst>
+              <a:ext uri="{FF2B5EF4-FFF2-40B4-BE49-F238E27FC236}">
+                <a16:creationId xmlns:a16="http://schemas.microsoft.com/office/drawing/2014/main" id="{BA3042D6-6002-417C-93D0-8FCE3D1E7633}"/>
+              </a:ext>
+            </a:extLst>
+          </p:cNvPr>
+          <p:cNvSpPr txBox="1"/>
+          <p:nvPr/>
+        </p:nvSpPr>
+        <p:spPr>
+          <a:xfrm>
+            <a:off x="5697415" y="362596"/>
+            <a:ext cx="1233776" cy="523220"/>
+          </a:xfrm>
+          <a:prstGeom prst="rect">
+            <a:avLst/>
+          </a:prstGeom>
+          <a:noFill/>
+          <a:ln>
+            <a:solidFill>
+              <a:schemeClr val="tx1"/>
+            </a:solidFill>
+          </a:ln>
+        </p:spPr>
+        <p:txBody>
+          <a:bodyPr wrap="square" rtlCol="0">
+            <a:spAutoFit/>
+          </a:bodyPr>
+          <a:lstStyle/>
+          <a:p>
+            <a:pPr algn="ctr"/>
+            <a:r>
+              <a:rPr lang="de-DE" sz="2800" spc="600" dirty="0">
+                <a:latin typeface="Corbel Light" panose="020B0303020204020204" pitchFamily="34" charset="0"/>
+              </a:rPr>
+              <a:t>32%</a:t>
+            </a:r>
+          </a:p>
+        </p:txBody>
+      </p:sp>
+      <p:sp>
+        <p:nvSpPr>
+          <p:cNvPr id="12" name="Textfeld 11">
+            <a:extLst>
+              <a:ext uri="{FF2B5EF4-FFF2-40B4-BE49-F238E27FC236}">
+                <a16:creationId xmlns:a16="http://schemas.microsoft.com/office/drawing/2014/main" id="{3DB282F9-9955-4987-A9EC-F59319B64096}"/>
+              </a:ext>
+            </a:extLst>
+          </p:cNvPr>
+          <p:cNvSpPr txBox="1"/>
+          <p:nvPr/>
+        </p:nvSpPr>
+        <p:spPr>
+          <a:xfrm>
+            <a:off x="515891" y="1033741"/>
+            <a:ext cx="11318555" cy="2610843"/>
+          </a:xfrm>
+          <a:prstGeom prst="rect">
+            <a:avLst/>
+          </a:prstGeom>
+          <a:noFill/>
+          <a:ln>
+            <a:solidFill>
+              <a:schemeClr val="tx1"/>
+            </a:solidFill>
+          </a:ln>
+        </p:spPr>
+        <p:txBody>
+          <a:bodyPr wrap="square" rtlCol="0">
+            <a:spAutoFit/>
+          </a:bodyPr>
+          <a:lstStyle/>
+          <a:p>
+            <a:pPr marL="457200" indent="-457200">
+              <a:lnSpc>
+                <a:spcPct val="150000"/>
+              </a:lnSpc>
+              <a:buFont typeface="Courier New" panose="02070309020205020404" pitchFamily="49" charset="0"/>
+              <a:buChar char="o"/>
+            </a:pPr>
+            <a:r>
+              <a:rPr lang="de-DE" sz="2800" spc="600" dirty="0">
+                <a:latin typeface="Corbel Light" panose="020B0303020204020204" pitchFamily="34" charset="0"/>
+              </a:rPr>
+              <a:t>Punkt 1</a:t>
+            </a:r>
+          </a:p>
+          <a:p>
+            <a:pPr marL="457200" indent="-457200">
+              <a:lnSpc>
+                <a:spcPct val="150000"/>
+              </a:lnSpc>
+              <a:buFont typeface="Courier New" panose="02070309020205020404" pitchFamily="49" charset="0"/>
+              <a:buChar char="o"/>
+            </a:pPr>
+            <a:r>
+              <a:rPr lang="de-DE" sz="2800" spc="600" dirty="0">
+                <a:latin typeface="Corbel Light" panose="020B0303020204020204" pitchFamily="34" charset="0"/>
+              </a:rPr>
+              <a:t>Punkt 2</a:t>
+            </a:r>
+          </a:p>
+          <a:p>
+            <a:pPr marL="457200" indent="-457200">
+              <a:lnSpc>
+                <a:spcPct val="150000"/>
+              </a:lnSpc>
+              <a:buFont typeface="Courier New" panose="02070309020205020404" pitchFamily="49" charset="0"/>
+              <a:buChar char="o"/>
+            </a:pPr>
+            <a:r>
+              <a:rPr lang="de-DE" sz="2800" spc="600" dirty="0">
+                <a:latin typeface="Corbel Light" panose="020B0303020204020204" pitchFamily="34" charset="0"/>
+              </a:rPr>
+              <a:t>Punkt 3</a:t>
+            </a:r>
+          </a:p>
+          <a:p>
+            <a:pPr marL="457200" indent="-457200">
+              <a:lnSpc>
+                <a:spcPct val="150000"/>
+              </a:lnSpc>
+              <a:buFont typeface="Courier New" panose="02070309020205020404" pitchFamily="49" charset="0"/>
+              <a:buChar char="o"/>
+            </a:pPr>
+            <a:r>
+              <a:rPr lang="de-DE" sz="2800" spc="600" dirty="0">
+                <a:latin typeface="Corbel Light" panose="020B0303020204020204" pitchFamily="34" charset="0"/>
+              </a:rPr>
+              <a:t>Punkt 4</a:t>
+            </a:r>
+          </a:p>
+        </p:txBody>
+      </p:sp>
+    </p:spTree>
+    <p:extLst>
+      <p:ext uri="{BB962C8B-B14F-4D97-AF65-F5344CB8AC3E}">
+        <p14:creationId xmlns:p14="http://schemas.microsoft.com/office/powerpoint/2010/main" val="1817869938"/>
+      </p:ext>
+    </p:extLst>
+  </p:cSld>
+  <p:clrMapOvr>
+    <a:masterClrMapping/>
+  </p:clrMapOvr>
+  <p:transition spd="slow">
+    <p:push dir="u"/>
+  </p:transition>
+</p:sld>
+</file>
+
+<file path=ppt/slides/slide4.xml><?xml version="1.0" encoding="utf-8"?>
+<p:sld xmlns:a="http://schemas.openxmlformats.org/drawingml/2006/main" xmlns:r="http://schemas.openxmlformats.org/officeDocument/2006/relationships" xmlns:p="http://schemas.openxmlformats.org/presentationml/2006/main">
+  <p:cSld>
+    <p:spTree>
+      <p:nvGrpSpPr>
+        <p:cNvPr id="1" name=""/>
+        <p:cNvGrpSpPr/>
+        <p:nvPr/>
+      </p:nvGrpSpPr>
+      <p:grpSpPr>
+        <a:xfrm>
+          <a:off x="0" y="0"/>
+          <a:ext cx="0" cy="0"/>
+          <a:chOff x="0" y="0"/>
+          <a:chExt cx="0" cy="0"/>
+        </a:xfrm>
+      </p:grpSpPr>
+      <p:sp>
+        <p:nvSpPr>
+          <p:cNvPr id="15" name="Textfeld 14">
+            <a:extLst>
+              <a:ext uri="{FF2B5EF4-FFF2-40B4-BE49-F238E27FC236}">
+                <a16:creationId xmlns:a16="http://schemas.microsoft.com/office/drawing/2014/main" id="{EDC0117D-58F4-467D-B022-5970DDCB4994}"/>
+              </a:ext>
+            </a:extLst>
+          </p:cNvPr>
+          <p:cNvSpPr txBox="1"/>
+          <p:nvPr/>
+        </p:nvSpPr>
+        <p:spPr>
+          <a:xfrm>
+            <a:off x="515891" y="362596"/>
+            <a:ext cx="5023184" cy="523220"/>
+          </a:xfrm>
+          <a:prstGeom prst="rect">
+            <a:avLst/>
+          </a:prstGeom>
+          <a:noFill/>
+          <a:ln>
+            <a:solidFill>
+              <a:schemeClr val="tx1"/>
+            </a:solidFill>
+          </a:ln>
+        </p:spPr>
+        <p:txBody>
+          <a:bodyPr wrap="square" rtlCol="0">
+            <a:spAutoFit/>
+          </a:bodyPr>
+          <a:lstStyle/>
+          <a:p>
+            <a:pPr algn="ctr"/>
+            <a:r>
+              <a:rPr lang="de-DE" sz="2800" spc="600" dirty="0">
+                <a:latin typeface="Corbel Light" panose="020B0303020204020204" pitchFamily="34" charset="0"/>
+              </a:rPr>
+              <a:t>Hardware</a:t>
+            </a:r>
+          </a:p>
+        </p:txBody>
+      </p:sp>
+      <p:sp>
+        <p:nvSpPr>
+          <p:cNvPr id="11" name="Textfeld 10">
+            <a:extLst>
+              <a:ext uri="{FF2B5EF4-FFF2-40B4-BE49-F238E27FC236}">
+                <a16:creationId xmlns:a16="http://schemas.microsoft.com/office/drawing/2014/main" id="{BA3042D6-6002-417C-93D0-8FCE3D1E7633}"/>
+              </a:ext>
+            </a:extLst>
+          </p:cNvPr>
+          <p:cNvSpPr txBox="1"/>
+          <p:nvPr/>
+        </p:nvSpPr>
+        <p:spPr>
+          <a:xfrm>
+            <a:off x="5697415" y="362596"/>
+            <a:ext cx="1233776" cy="523220"/>
+          </a:xfrm>
+          <a:prstGeom prst="rect">
+            <a:avLst/>
+          </a:prstGeom>
+          <a:noFill/>
+          <a:ln>
+            <a:solidFill>
+              <a:schemeClr val="tx1"/>
+            </a:solidFill>
+          </a:ln>
+        </p:spPr>
+        <p:txBody>
+          <a:bodyPr wrap="square" rtlCol="0">
+            <a:spAutoFit/>
+          </a:bodyPr>
+          <a:lstStyle/>
+          <a:p>
+            <a:pPr algn="ctr"/>
+            <a:r>
+              <a:rPr lang="de-DE" sz="2800" spc="600" dirty="0">
+                <a:latin typeface="Corbel Light" panose="020B0303020204020204" pitchFamily="34" charset="0"/>
+              </a:rPr>
+              <a:t>32%</a:t>
+            </a:r>
+          </a:p>
+        </p:txBody>
+      </p:sp>
+      <p:sp>
+        <p:nvSpPr>
+          <p:cNvPr id="12" name="Textfeld 11">
+            <a:extLst>
+              <a:ext uri="{FF2B5EF4-FFF2-40B4-BE49-F238E27FC236}">
+                <a16:creationId xmlns:a16="http://schemas.microsoft.com/office/drawing/2014/main" id="{3DB282F9-9955-4987-A9EC-F59319B64096}"/>
+              </a:ext>
+            </a:extLst>
+          </p:cNvPr>
+          <p:cNvSpPr txBox="1"/>
+          <p:nvPr/>
+        </p:nvSpPr>
+        <p:spPr>
+          <a:xfrm>
+            <a:off x="515890" y="1095288"/>
+            <a:ext cx="11318555" cy="2610843"/>
+          </a:xfrm>
+          <a:prstGeom prst="rect">
+            <a:avLst/>
+          </a:prstGeom>
+          <a:noFill/>
+          <a:ln>
+            <a:solidFill>
+              <a:schemeClr val="tx1"/>
+            </a:solidFill>
+          </a:ln>
+        </p:spPr>
+        <p:txBody>
+          <a:bodyPr wrap="square" rtlCol="0">
+            <a:spAutoFit/>
+          </a:bodyPr>
+          <a:lstStyle/>
+          <a:p>
+            <a:pPr marL="457200" indent="-457200">
+              <a:lnSpc>
+                <a:spcPct val="150000"/>
+              </a:lnSpc>
+              <a:buFont typeface="Courier New" panose="02070309020205020404" pitchFamily="49" charset="0"/>
+              <a:buChar char="o"/>
+            </a:pPr>
+            <a:r>
+              <a:rPr lang="de-DE" sz="2800" spc="600" dirty="0">
+                <a:latin typeface="Corbel Light" panose="020B0303020204020204" pitchFamily="34" charset="0"/>
+              </a:rPr>
+              <a:t>Punkt 1</a:t>
+            </a:r>
+          </a:p>
+          <a:p>
+            <a:pPr marL="457200" indent="-457200">
+              <a:lnSpc>
+                <a:spcPct val="150000"/>
+              </a:lnSpc>
+              <a:buFont typeface="Courier New" panose="02070309020205020404" pitchFamily="49" charset="0"/>
+              <a:buChar char="o"/>
+            </a:pPr>
+            <a:r>
+              <a:rPr lang="de-DE" sz="2800" spc="600" dirty="0">
+                <a:latin typeface="Corbel Light" panose="020B0303020204020204" pitchFamily="34" charset="0"/>
+              </a:rPr>
+              <a:t>Punkt 2</a:t>
+            </a:r>
+          </a:p>
+          <a:p>
+            <a:pPr marL="457200" indent="-457200">
+              <a:lnSpc>
+                <a:spcPct val="150000"/>
+              </a:lnSpc>
+              <a:buFont typeface="Courier New" panose="02070309020205020404" pitchFamily="49" charset="0"/>
+              <a:buChar char="o"/>
+            </a:pPr>
+            <a:r>
+              <a:rPr lang="de-DE" sz="2800" spc="600" dirty="0">
+                <a:latin typeface="Corbel Light" panose="020B0303020204020204" pitchFamily="34" charset="0"/>
+              </a:rPr>
+              <a:t>Punkt 3</a:t>
+            </a:r>
+          </a:p>
+          <a:p>
+            <a:pPr marL="457200" indent="-457200">
+              <a:lnSpc>
+                <a:spcPct val="150000"/>
+              </a:lnSpc>
+              <a:buFont typeface="Courier New" panose="02070309020205020404" pitchFamily="49" charset="0"/>
+              <a:buChar char="o"/>
+            </a:pPr>
+            <a:r>
+              <a:rPr lang="de-DE" sz="2800" spc="600" dirty="0">
+                <a:latin typeface="Corbel Light" panose="020B0303020204020204" pitchFamily="34" charset="0"/>
+              </a:rPr>
+              <a:t>Punkt 4</a:t>
+            </a:r>
+          </a:p>
+        </p:txBody>
+      </p:sp>
+    </p:spTree>
+    <p:extLst>
+      <p:ext uri="{BB962C8B-B14F-4D97-AF65-F5344CB8AC3E}">
+        <p14:creationId xmlns:p14="http://schemas.microsoft.com/office/powerpoint/2010/main" val="1925717297"/>
+      </p:ext>
+    </p:extLst>
+  </p:cSld>
+  <p:clrMapOvr>
+    <a:masterClrMapping/>
+  </p:clrMapOvr>
+  <p:transition spd="slow">
+    <p:push dir="u"/>
+  </p:transition>
+</p:sld>
+</file>
+
+<file path=ppt/slides/slide5.xml><?xml version="1.0" encoding="utf-8"?>
+<p:sld xmlns:a="http://schemas.openxmlformats.org/drawingml/2006/main" xmlns:r="http://schemas.openxmlformats.org/officeDocument/2006/relationships" xmlns:p="http://schemas.openxmlformats.org/presentationml/2006/main">
+  <p:cSld>
+    <p:spTree>
+      <p:nvGrpSpPr>
+        <p:cNvPr id="1" name=""/>
+        <p:cNvGrpSpPr/>
+        <p:nvPr/>
+      </p:nvGrpSpPr>
+      <p:grpSpPr>
+        <a:xfrm>
+          <a:off x="0" y="0"/>
+          <a:ext cx="0" cy="0"/>
+          <a:chOff x="0" y="0"/>
+          <a:chExt cx="0" cy="0"/>
+        </a:xfrm>
+      </p:grpSpPr>
+      <p:sp>
+        <p:nvSpPr>
+          <p:cNvPr id="15" name="Textfeld 14">
+            <a:extLst>
+              <a:ext uri="{FF2B5EF4-FFF2-40B4-BE49-F238E27FC236}">
+                <a16:creationId xmlns:a16="http://schemas.microsoft.com/office/drawing/2014/main" id="{EDC0117D-58F4-467D-B022-5970DDCB4994}"/>
+              </a:ext>
+            </a:extLst>
+          </p:cNvPr>
+          <p:cNvSpPr txBox="1"/>
+          <p:nvPr/>
+        </p:nvSpPr>
+        <p:spPr>
+          <a:xfrm>
+            <a:off x="515891" y="362596"/>
+            <a:ext cx="5023184" cy="523220"/>
+          </a:xfrm>
+          <a:prstGeom prst="rect">
+            <a:avLst/>
+          </a:prstGeom>
+          <a:noFill/>
+          <a:ln>
+            <a:solidFill>
+              <a:schemeClr val="tx1"/>
+            </a:solidFill>
+          </a:ln>
+        </p:spPr>
+        <p:txBody>
+          <a:bodyPr wrap="square" rtlCol="0">
+            <a:spAutoFit/>
+          </a:bodyPr>
+          <a:lstStyle/>
+          <a:p>
+            <a:pPr algn="ctr"/>
+            <a:r>
+              <a:rPr lang="de-DE" sz="2800" spc="600" dirty="0">
+                <a:latin typeface="Corbel Light" panose="020B0303020204020204" pitchFamily="34" charset="0"/>
+              </a:rPr>
+              <a:t>Software</a:t>
+            </a:r>
+          </a:p>
+        </p:txBody>
+      </p:sp>
+      <p:sp>
+        <p:nvSpPr>
+          <p:cNvPr id="11" name="Textfeld 10">
+            <a:extLst>
+              <a:ext uri="{FF2B5EF4-FFF2-40B4-BE49-F238E27FC236}">
+                <a16:creationId xmlns:a16="http://schemas.microsoft.com/office/drawing/2014/main" id="{BA3042D6-6002-417C-93D0-8FCE3D1E7633}"/>
+              </a:ext>
+            </a:extLst>
+          </p:cNvPr>
+          <p:cNvSpPr txBox="1"/>
+          <p:nvPr/>
+        </p:nvSpPr>
+        <p:spPr>
+          <a:xfrm>
+            <a:off x="5697415" y="362596"/>
+            <a:ext cx="1233776" cy="523220"/>
+          </a:xfrm>
+          <a:prstGeom prst="rect">
+            <a:avLst/>
+          </a:prstGeom>
+          <a:noFill/>
+          <a:ln>
+            <a:solidFill>
+              <a:schemeClr val="tx1"/>
+            </a:solidFill>
+          </a:ln>
+        </p:spPr>
+        <p:txBody>
+          <a:bodyPr wrap="square" rtlCol="0">
+            <a:spAutoFit/>
+          </a:bodyPr>
+          <a:lstStyle/>
+          <a:p>
+            <a:pPr algn="ctr"/>
+            <a:r>
+              <a:rPr lang="de-DE" sz="2800" spc="600" dirty="0">
+                <a:latin typeface="Corbel Light" panose="020B0303020204020204" pitchFamily="34" charset="0"/>
+              </a:rPr>
+              <a:t>32%</a:t>
+            </a:r>
+          </a:p>
+        </p:txBody>
+      </p:sp>
+      <p:sp>
+        <p:nvSpPr>
+          <p:cNvPr id="12" name="Textfeld 11">
+            <a:extLst>
+              <a:ext uri="{FF2B5EF4-FFF2-40B4-BE49-F238E27FC236}">
+                <a16:creationId xmlns:a16="http://schemas.microsoft.com/office/drawing/2014/main" id="{3DB282F9-9955-4987-A9EC-F59319B64096}"/>
+              </a:ext>
+            </a:extLst>
+          </p:cNvPr>
+          <p:cNvSpPr txBox="1"/>
+          <p:nvPr/>
+        </p:nvSpPr>
+        <p:spPr>
+          <a:xfrm>
+            <a:off x="515890" y="1095288"/>
+            <a:ext cx="11318555" cy="2610843"/>
+          </a:xfrm>
+          <a:prstGeom prst="rect">
+            <a:avLst/>
+          </a:prstGeom>
+          <a:noFill/>
+          <a:ln>
+            <a:solidFill>
+              <a:schemeClr val="tx1"/>
+            </a:solidFill>
+          </a:ln>
+        </p:spPr>
+        <p:txBody>
+          <a:bodyPr wrap="square" rtlCol="0">
+            <a:spAutoFit/>
+          </a:bodyPr>
+          <a:lstStyle/>
+          <a:p>
+            <a:pPr marL="457200" indent="-457200">
+              <a:lnSpc>
+                <a:spcPct val="150000"/>
+              </a:lnSpc>
+              <a:buFont typeface="Courier New" panose="02070309020205020404" pitchFamily="49" charset="0"/>
+              <a:buChar char="o"/>
+            </a:pPr>
+            <a:r>
+              <a:rPr lang="de-DE" sz="2800" spc="600" dirty="0">
+                <a:latin typeface="Corbel Light" panose="020B0303020204020204" pitchFamily="34" charset="0"/>
+              </a:rPr>
+              <a:t>Punkt 1</a:t>
+            </a:r>
+          </a:p>
+          <a:p>
+            <a:pPr marL="457200" indent="-457200">
+              <a:lnSpc>
+                <a:spcPct val="150000"/>
+              </a:lnSpc>
+              <a:buFont typeface="Courier New" panose="02070309020205020404" pitchFamily="49" charset="0"/>
+              <a:buChar char="o"/>
+            </a:pPr>
+            <a:r>
+              <a:rPr lang="de-DE" sz="2800" spc="600" dirty="0">
+                <a:latin typeface="Corbel Light" panose="020B0303020204020204" pitchFamily="34" charset="0"/>
+              </a:rPr>
+              <a:t>Punkt 2</a:t>
+            </a:r>
+          </a:p>
+          <a:p>
+            <a:pPr marL="457200" indent="-457200">
+              <a:lnSpc>
+                <a:spcPct val="150000"/>
+              </a:lnSpc>
+              <a:buFont typeface="Courier New" panose="02070309020205020404" pitchFamily="49" charset="0"/>
+              <a:buChar char="o"/>
+            </a:pPr>
+            <a:r>
+              <a:rPr lang="de-DE" sz="2800" spc="600" dirty="0">
+                <a:latin typeface="Corbel Light" panose="020B0303020204020204" pitchFamily="34" charset="0"/>
+              </a:rPr>
+              <a:t>Punkt 3</a:t>
+            </a:r>
+          </a:p>
+          <a:p>
+            <a:pPr marL="457200" indent="-457200">
+              <a:lnSpc>
+                <a:spcPct val="150000"/>
+              </a:lnSpc>
+              <a:buFont typeface="Courier New" panose="02070309020205020404" pitchFamily="49" charset="0"/>
+              <a:buChar char="o"/>
+            </a:pPr>
+            <a:r>
+              <a:rPr lang="de-DE" sz="2800" spc="600" dirty="0">
+                <a:latin typeface="Corbel Light" panose="020B0303020204020204" pitchFamily="34" charset="0"/>
+              </a:rPr>
+              <a:t>Punkt 4</a:t>
+            </a:r>
+          </a:p>
+        </p:txBody>
+      </p:sp>
+    </p:spTree>
+    <p:extLst>
+      <p:ext uri="{BB962C8B-B14F-4D97-AF65-F5344CB8AC3E}">
+        <p14:creationId xmlns:p14="http://schemas.microsoft.com/office/powerpoint/2010/main" val="129407845"/>
+      </p:ext>
+    </p:extLst>
+  </p:cSld>
+  <p:clrMapOvr>
+    <a:masterClrMapping/>
+  </p:clrMapOvr>
+  <p:transition spd="slow">
+    <p:push dir="u"/>
+  </p:transition>
+</p:sld>
+</file>
+
+<file path=ppt/slides/slide6.xml><?xml version="1.0" encoding="utf-8"?>
+<p:sld xmlns:a="http://schemas.openxmlformats.org/drawingml/2006/main" xmlns:r="http://schemas.openxmlformats.org/officeDocument/2006/relationships" xmlns:p="http://schemas.openxmlformats.org/presentationml/2006/main">
+  <p:cSld>
+    <p:spTree>
+      <p:nvGrpSpPr>
+        <p:cNvPr id="1" name=""/>
+        <p:cNvGrpSpPr/>
+        <p:nvPr/>
+      </p:nvGrpSpPr>
+      <p:grpSpPr>
+        <a:xfrm>
+          <a:off x="0" y="0"/>
+          <a:ext cx="0" cy="0"/>
+          <a:chOff x="0" y="0"/>
+          <a:chExt cx="0" cy="0"/>
+        </a:xfrm>
+      </p:grpSpPr>
+      <p:sp>
+        <p:nvSpPr>
+          <p:cNvPr id="15" name="Textfeld 14">
+            <a:extLst>
+              <a:ext uri="{FF2B5EF4-FFF2-40B4-BE49-F238E27FC236}">
+                <a16:creationId xmlns:a16="http://schemas.microsoft.com/office/drawing/2014/main" id="{EDC0117D-58F4-467D-B022-5970DDCB4994}"/>
+              </a:ext>
+            </a:extLst>
+          </p:cNvPr>
+          <p:cNvSpPr txBox="1"/>
+          <p:nvPr/>
+        </p:nvSpPr>
+        <p:spPr>
+          <a:xfrm>
+            <a:off x="515891" y="362596"/>
+            <a:ext cx="5023184" cy="523220"/>
+          </a:xfrm>
+          <a:prstGeom prst="rect">
+            <a:avLst/>
+          </a:prstGeom>
+          <a:noFill/>
+          <a:ln>
+            <a:solidFill>
+              <a:schemeClr val="tx1"/>
+            </a:solidFill>
+          </a:ln>
+        </p:spPr>
+        <p:txBody>
+          <a:bodyPr wrap="square" rtlCol="0">
+            <a:spAutoFit/>
+          </a:bodyPr>
+          <a:lstStyle/>
+          <a:p>
+            <a:pPr algn="ctr"/>
+            <a:r>
+              <a:rPr lang="de-DE" sz="2800" spc="600" dirty="0">
+                <a:latin typeface="Corbel Light" panose="020B0303020204020204" pitchFamily="34" charset="0"/>
+              </a:rPr>
+              <a:t>Herausforderungen</a:t>
+            </a:r>
+          </a:p>
+        </p:txBody>
+      </p:sp>
+      <p:sp>
+        <p:nvSpPr>
+          <p:cNvPr id="11" name="Textfeld 10">
+            <a:extLst>
+              <a:ext uri="{FF2B5EF4-FFF2-40B4-BE49-F238E27FC236}">
+                <a16:creationId xmlns:a16="http://schemas.microsoft.com/office/drawing/2014/main" id="{BA3042D6-6002-417C-93D0-8FCE3D1E7633}"/>
+              </a:ext>
+            </a:extLst>
+          </p:cNvPr>
+          <p:cNvSpPr txBox="1"/>
+          <p:nvPr/>
+        </p:nvSpPr>
+        <p:spPr>
+          <a:xfrm>
+            <a:off x="5697415" y="362596"/>
+            <a:ext cx="1233776" cy="523220"/>
+          </a:xfrm>
+          <a:prstGeom prst="rect">
+            <a:avLst/>
+          </a:prstGeom>
+          <a:noFill/>
+          <a:ln>
+            <a:solidFill>
+              <a:schemeClr val="tx1"/>
+            </a:solidFill>
+          </a:ln>
+        </p:spPr>
+        <p:txBody>
+          <a:bodyPr wrap="square" rtlCol="0">
+            <a:spAutoFit/>
+          </a:bodyPr>
+          <a:lstStyle/>
+          <a:p>
+            <a:pPr algn="ctr"/>
+            <a:r>
+              <a:rPr lang="de-DE" sz="2800" spc="600" dirty="0">
+                <a:latin typeface="Corbel Light" panose="020B0303020204020204" pitchFamily="34" charset="0"/>
+              </a:rPr>
+              <a:t>32%</a:t>
+            </a:r>
+          </a:p>
+        </p:txBody>
+      </p:sp>
+      <p:sp>
+        <p:nvSpPr>
+          <p:cNvPr id="12" name="Textfeld 11">
+            <a:extLst>
+              <a:ext uri="{FF2B5EF4-FFF2-40B4-BE49-F238E27FC236}">
+                <a16:creationId xmlns:a16="http://schemas.microsoft.com/office/drawing/2014/main" id="{3DB282F9-9955-4987-A9EC-F59319B64096}"/>
+              </a:ext>
+            </a:extLst>
+          </p:cNvPr>
+          <p:cNvSpPr txBox="1"/>
+          <p:nvPr/>
+        </p:nvSpPr>
+        <p:spPr>
+          <a:xfrm>
+            <a:off x="515890" y="1095288"/>
+            <a:ext cx="11318555" cy="2610843"/>
+          </a:xfrm>
+          <a:prstGeom prst="rect">
+            <a:avLst/>
+          </a:prstGeom>
+          <a:noFill/>
+          <a:ln>
+            <a:solidFill>
+              <a:schemeClr val="tx1"/>
+            </a:solidFill>
+          </a:ln>
+        </p:spPr>
+        <p:txBody>
+          <a:bodyPr wrap="square" rtlCol="0">
+            <a:spAutoFit/>
+          </a:bodyPr>
+          <a:lstStyle/>
+          <a:p>
+            <a:pPr marL="457200" indent="-457200">
+              <a:lnSpc>
+                <a:spcPct val="150000"/>
+              </a:lnSpc>
+              <a:buFont typeface="Courier New" panose="02070309020205020404" pitchFamily="49" charset="0"/>
+              <a:buChar char="o"/>
+            </a:pPr>
+            <a:r>
+              <a:rPr lang="de-DE" sz="2800" spc="600" dirty="0">
+                <a:latin typeface="Corbel Light" panose="020B0303020204020204" pitchFamily="34" charset="0"/>
+              </a:rPr>
+              <a:t>Punkt 1</a:t>
+            </a:r>
+          </a:p>
+          <a:p>
+            <a:pPr marL="457200" indent="-457200">
+              <a:lnSpc>
+                <a:spcPct val="150000"/>
+              </a:lnSpc>
+              <a:buFont typeface="Courier New" panose="02070309020205020404" pitchFamily="49" charset="0"/>
+              <a:buChar char="o"/>
+            </a:pPr>
+            <a:r>
+              <a:rPr lang="de-DE" sz="2800" spc="600" dirty="0">
+                <a:latin typeface="Corbel Light" panose="020B0303020204020204" pitchFamily="34" charset="0"/>
+              </a:rPr>
+              <a:t>Punkt 2</a:t>
+            </a:r>
+          </a:p>
+          <a:p>
+            <a:pPr marL="457200" indent="-457200">
+              <a:lnSpc>
+                <a:spcPct val="150000"/>
+              </a:lnSpc>
+              <a:buFont typeface="Courier New" panose="02070309020205020404" pitchFamily="49" charset="0"/>
+              <a:buChar char="o"/>
+            </a:pPr>
+            <a:r>
+              <a:rPr lang="de-DE" sz="2800" spc="600" dirty="0">
+                <a:latin typeface="Corbel Light" panose="020B0303020204020204" pitchFamily="34" charset="0"/>
+              </a:rPr>
+              <a:t>Punkt 3</a:t>
+            </a:r>
+          </a:p>
+          <a:p>
+            <a:pPr marL="457200" indent="-457200">
+              <a:lnSpc>
+                <a:spcPct val="150000"/>
+              </a:lnSpc>
+              <a:buFont typeface="Courier New" panose="02070309020205020404" pitchFamily="49" charset="0"/>
+              <a:buChar char="o"/>
+            </a:pPr>
+            <a:r>
+              <a:rPr lang="de-DE" sz="2800" spc="600" dirty="0">
+                <a:latin typeface="Corbel Light" panose="020B0303020204020204" pitchFamily="34" charset="0"/>
+              </a:rPr>
+              <a:t>Punkt 4</a:t>
+            </a:r>
+          </a:p>
+        </p:txBody>
+      </p:sp>
+    </p:spTree>
+    <p:extLst>
+      <p:ext uri="{BB962C8B-B14F-4D97-AF65-F5344CB8AC3E}">
+        <p14:creationId xmlns:p14="http://schemas.microsoft.com/office/powerpoint/2010/main" val="4170590430"/>
+      </p:ext>
+    </p:extLst>
+  </p:cSld>
+  <p:clrMapOvr>
+    <a:masterClrMapping/>
+  </p:clrMapOvr>
+  <p:transition spd="slow">
+    <p:push dir="u"/>
+  </p:transition>
+</p:sld>
+</file>
+
+<file path=ppt/slides/slide7.xml><?xml version="1.0" encoding="utf-8"?>
+<p:sld xmlns:a="http://schemas.openxmlformats.org/drawingml/2006/main" xmlns:r="http://schemas.openxmlformats.org/officeDocument/2006/relationships" xmlns:p="http://schemas.openxmlformats.org/presentationml/2006/main">
+  <p:cSld>
+    <p:spTree>
+      <p:nvGrpSpPr>
+        <p:cNvPr id="1" name=""/>
+        <p:cNvGrpSpPr/>
+        <p:nvPr/>
+      </p:nvGrpSpPr>
+      <p:grpSpPr>
+        <a:xfrm>
+          <a:off x="0" y="0"/>
+          <a:ext cx="0" cy="0"/>
+          <a:chOff x="0" y="0"/>
+          <a:chExt cx="0" cy="0"/>
+        </a:xfrm>
+      </p:grpSpPr>
+      <p:sp>
+        <p:nvSpPr>
+          <p:cNvPr id="15" name="Textfeld 14">
+            <a:extLst>
+              <a:ext uri="{FF2B5EF4-FFF2-40B4-BE49-F238E27FC236}">
+                <a16:creationId xmlns:a16="http://schemas.microsoft.com/office/drawing/2014/main" id="{EDC0117D-58F4-467D-B022-5970DDCB4994}"/>
+              </a:ext>
+            </a:extLst>
+          </p:cNvPr>
+          <p:cNvSpPr txBox="1"/>
+          <p:nvPr/>
+        </p:nvSpPr>
+        <p:spPr>
+          <a:xfrm>
+            <a:off x="515891" y="362596"/>
+            <a:ext cx="5023184" cy="523220"/>
+          </a:xfrm>
+          <a:prstGeom prst="rect">
+            <a:avLst/>
+          </a:prstGeom>
+          <a:noFill/>
+          <a:ln>
+            <a:solidFill>
+              <a:schemeClr val="tx1"/>
+            </a:solidFill>
+          </a:ln>
+        </p:spPr>
+        <p:txBody>
+          <a:bodyPr wrap="square" rtlCol="0">
+            <a:spAutoFit/>
+          </a:bodyPr>
+          <a:lstStyle/>
+          <a:p>
+            <a:pPr algn="ctr"/>
+            <a:r>
+              <a:rPr lang="de-DE" sz="2800" spc="600" dirty="0">
+                <a:latin typeface="Corbel Light" panose="020B0303020204020204" pitchFamily="34" charset="0"/>
+              </a:rPr>
+              <a:t>Fazit</a:t>
+            </a:r>
+          </a:p>
+        </p:txBody>
+      </p:sp>
+      <p:sp>
+        <p:nvSpPr>
+          <p:cNvPr id="12" name="Textfeld 11">
+            <a:extLst>
+              <a:ext uri="{FF2B5EF4-FFF2-40B4-BE49-F238E27FC236}">
+                <a16:creationId xmlns:a16="http://schemas.microsoft.com/office/drawing/2014/main" id="{3DB282F9-9955-4987-A9EC-F59319B64096}"/>
+              </a:ext>
+            </a:extLst>
+          </p:cNvPr>
+          <p:cNvSpPr txBox="1"/>
+          <p:nvPr/>
+        </p:nvSpPr>
+        <p:spPr>
+          <a:xfrm>
+            <a:off x="515890" y="1095288"/>
+            <a:ext cx="11318555" cy="2610843"/>
+          </a:xfrm>
+          <a:prstGeom prst="rect">
+            <a:avLst/>
+          </a:prstGeom>
+          <a:noFill/>
+          <a:ln>
+            <a:solidFill>
+              <a:schemeClr val="tx1"/>
+            </a:solidFill>
+          </a:ln>
+        </p:spPr>
+        <p:txBody>
+          <a:bodyPr wrap="square" rtlCol="0">
+            <a:spAutoFit/>
+          </a:bodyPr>
+          <a:lstStyle/>
+          <a:p>
+            <a:pPr marL="457200" indent="-457200">
+              <a:lnSpc>
+                <a:spcPct val="150000"/>
+              </a:lnSpc>
+              <a:buFont typeface="Courier New" panose="02070309020205020404" pitchFamily="49" charset="0"/>
+              <a:buChar char="o"/>
+            </a:pPr>
+            <a:r>
+              <a:rPr lang="de-DE" sz="2800" spc="600" dirty="0">
+                <a:latin typeface="Corbel Light" panose="020B0303020204020204" pitchFamily="34" charset="0"/>
+              </a:rPr>
+              <a:t>Punkt 1</a:t>
+            </a:r>
+          </a:p>
+          <a:p>
+            <a:pPr marL="457200" indent="-457200">
+              <a:lnSpc>
+                <a:spcPct val="150000"/>
+              </a:lnSpc>
+              <a:buFont typeface="Courier New" panose="02070309020205020404" pitchFamily="49" charset="0"/>
+              <a:buChar char="o"/>
+            </a:pPr>
+            <a:r>
+              <a:rPr lang="de-DE" sz="2800" spc="600" dirty="0">
+                <a:latin typeface="Corbel Light" panose="020B0303020204020204" pitchFamily="34" charset="0"/>
+              </a:rPr>
+              <a:t>Punkt 2</a:t>
+            </a:r>
+          </a:p>
+          <a:p>
+            <a:pPr marL="457200" indent="-457200">
+              <a:lnSpc>
+                <a:spcPct val="150000"/>
+              </a:lnSpc>
+              <a:buFont typeface="Courier New" panose="02070309020205020404" pitchFamily="49" charset="0"/>
+              <a:buChar char="o"/>
+            </a:pPr>
+            <a:r>
+              <a:rPr lang="de-DE" sz="2800" spc="600" dirty="0">
+                <a:latin typeface="Corbel Light" panose="020B0303020204020204" pitchFamily="34" charset="0"/>
+              </a:rPr>
+              <a:t>Punkt 3</a:t>
+            </a:r>
+          </a:p>
+          <a:p>
+            <a:pPr marL="457200" indent="-457200">
+              <a:lnSpc>
+                <a:spcPct val="150000"/>
+              </a:lnSpc>
+              <a:buFont typeface="Courier New" panose="02070309020205020404" pitchFamily="49" charset="0"/>
+              <a:buChar char="o"/>
+            </a:pPr>
+            <a:r>
+              <a:rPr lang="de-DE" sz="2800" spc="600" dirty="0">
+                <a:latin typeface="Corbel Light" panose="020B0303020204020204" pitchFamily="34" charset="0"/>
+              </a:rPr>
+              <a:t>Punkt 4</a:t>
+            </a:r>
+          </a:p>
+        </p:txBody>
+      </p:sp>
+    </p:spTree>
+    <p:extLst>
+      <p:ext uri="{BB962C8B-B14F-4D97-AF65-F5344CB8AC3E}">
+        <p14:creationId xmlns:p14="http://schemas.microsoft.com/office/powerpoint/2010/main" val="82320379"/>
+      </p:ext>
+    </p:extLst>
+  </p:cSld>
+  <p:clrMapOvr>
+    <a:masterClrMapping/>
+  </p:clrMapOvr>
+  <p:transition spd="slow">
+    <p:push dir="u"/>
+  </p:transition>
+</p:sld>
+</file>
+
+<file path=ppt/slides/slide8.xml><?xml version="1.0" encoding="utf-8"?>
+<p:sld xmlns:a="http://schemas.openxmlformats.org/drawingml/2006/main" xmlns:r="http://schemas.openxmlformats.org/officeDocument/2006/relationships" xmlns:p="http://schemas.openxmlformats.org/presentationml/2006/main">
+  <p:cSld>
+    <p:spTree>
+      <p:nvGrpSpPr>
+        <p:cNvPr id="1" name=""/>
+        <p:cNvGrpSpPr/>
+        <p:nvPr/>
+      </p:nvGrpSpPr>
+      <p:grpSpPr>
+        <a:xfrm>
+          <a:off x="0" y="0"/>
+          <a:ext cx="0" cy="0"/>
+          <a:chOff x="0" y="0"/>
+          <a:chExt cx="0" cy="0"/>
+        </a:xfrm>
+      </p:grpSpPr>
+      <p:sp>
+        <p:nvSpPr>
           <p:cNvPr id="2" name="Titel 1">
             <a:extLst>
               <a:ext uri="{FF2B5EF4-FFF2-40B4-BE49-F238E27FC236}">
@@ -3600,8 +4389,8 @@
         </p:nvSpPr>
         <p:spPr>
           <a:xfrm>
-            <a:off x="4994031" y="2523392"/>
-            <a:ext cx="2171700" cy="1529861"/>
+            <a:off x="7754816" y="3763108"/>
+            <a:ext cx="2171700" cy="1371600"/>
           </a:xfrm>
           <a:prstGeom prst="rect">
             <a:avLst/>

</xml_diff>